<commit_message>
Add the intermediate code generator of the seasub compiler
Traverses the abstract syntax tree and produces intermediate code.

The intermediate code uses the quadruple format:
    operator    operand_1    operand_2    result

Currently only integers are supported, therefore doubles
are removed from the demo file.
</commit_message>
<xml_diff>
--- a/img/Architecture.pptx
+++ b/img/Architecture.pptx
@@ -289,7 +289,7 @@
             <a:fld id="{8399FB5D-BC81-4368-A756-C14B3E59CBF6}" type="datetimeFigureOut">
               <a:rPr lang="sv-SE" smtClean="0"/>
               <a:pPr/>
-              <a:t>2021-11-05</a:t>
+              <a:t>2021-11-08</a:t>
             </a:fld>
             <a:endParaRPr lang="sv-SE"/>
           </a:p>
@@ -456,7 +456,7 @@
             <a:fld id="{8399FB5D-BC81-4368-A756-C14B3E59CBF6}" type="datetimeFigureOut">
               <a:rPr lang="sv-SE" smtClean="0"/>
               <a:pPr/>
-              <a:t>2021-11-05</a:t>
+              <a:t>2021-11-08</a:t>
             </a:fld>
             <a:endParaRPr lang="sv-SE"/>
           </a:p>
@@ -633,7 +633,7 @@
             <a:fld id="{8399FB5D-BC81-4368-A756-C14B3E59CBF6}" type="datetimeFigureOut">
               <a:rPr lang="sv-SE" smtClean="0"/>
               <a:pPr/>
-              <a:t>2021-11-05</a:t>
+              <a:t>2021-11-08</a:t>
             </a:fld>
             <a:endParaRPr lang="sv-SE"/>
           </a:p>
@@ -800,7 +800,7 @@
             <a:fld id="{8399FB5D-BC81-4368-A756-C14B3E59CBF6}" type="datetimeFigureOut">
               <a:rPr lang="sv-SE" smtClean="0"/>
               <a:pPr/>
-              <a:t>2021-11-05</a:t>
+              <a:t>2021-11-08</a:t>
             </a:fld>
             <a:endParaRPr lang="sv-SE"/>
           </a:p>
@@ -1043,7 +1043,7 @@
             <a:fld id="{8399FB5D-BC81-4368-A756-C14B3E59CBF6}" type="datetimeFigureOut">
               <a:rPr lang="sv-SE" smtClean="0"/>
               <a:pPr/>
-              <a:t>2021-11-05</a:t>
+              <a:t>2021-11-08</a:t>
             </a:fld>
             <a:endParaRPr lang="sv-SE"/>
           </a:p>
@@ -1328,7 +1328,7 @@
             <a:fld id="{8399FB5D-BC81-4368-A756-C14B3E59CBF6}" type="datetimeFigureOut">
               <a:rPr lang="sv-SE" smtClean="0"/>
               <a:pPr/>
-              <a:t>2021-11-05</a:t>
+              <a:t>2021-11-08</a:t>
             </a:fld>
             <a:endParaRPr lang="sv-SE"/>
           </a:p>
@@ -1747,7 +1747,7 @@
             <a:fld id="{8399FB5D-BC81-4368-A756-C14B3E59CBF6}" type="datetimeFigureOut">
               <a:rPr lang="sv-SE" smtClean="0"/>
               <a:pPr/>
-              <a:t>2021-11-05</a:t>
+              <a:t>2021-11-08</a:t>
             </a:fld>
             <a:endParaRPr lang="sv-SE"/>
           </a:p>
@@ -1862,7 +1862,7 @@
             <a:fld id="{8399FB5D-BC81-4368-A756-C14B3E59CBF6}" type="datetimeFigureOut">
               <a:rPr lang="sv-SE" smtClean="0"/>
               <a:pPr/>
-              <a:t>2021-11-05</a:t>
+              <a:t>2021-11-08</a:t>
             </a:fld>
             <a:endParaRPr lang="sv-SE"/>
           </a:p>
@@ -1954,7 +1954,7 @@
             <a:fld id="{8399FB5D-BC81-4368-A756-C14B3E59CBF6}" type="datetimeFigureOut">
               <a:rPr lang="sv-SE" smtClean="0"/>
               <a:pPr/>
-              <a:t>2021-11-05</a:t>
+              <a:t>2021-11-08</a:t>
             </a:fld>
             <a:endParaRPr lang="sv-SE"/>
           </a:p>
@@ -2228,7 +2228,7 @@
             <a:fld id="{8399FB5D-BC81-4368-A756-C14B3E59CBF6}" type="datetimeFigureOut">
               <a:rPr lang="sv-SE" smtClean="0"/>
               <a:pPr/>
-              <a:t>2021-11-05</a:t>
+              <a:t>2021-11-08</a:t>
             </a:fld>
             <a:endParaRPr lang="sv-SE"/>
           </a:p>
@@ -2478,7 +2478,7 @@
             <a:fld id="{8399FB5D-BC81-4368-A756-C14B3E59CBF6}" type="datetimeFigureOut">
               <a:rPr lang="sv-SE" smtClean="0"/>
               <a:pPr/>
-              <a:t>2021-11-05</a:t>
+              <a:t>2021-11-08</a:t>
             </a:fld>
             <a:endParaRPr lang="sv-SE"/>
           </a:p>
@@ -2688,7 +2688,7 @@
             <a:fld id="{8399FB5D-BC81-4368-A756-C14B3E59CBF6}" type="datetimeFigureOut">
               <a:rPr lang="sv-SE" smtClean="0"/>
               <a:pPr/>
-              <a:t>2021-11-05</a:t>
+              <a:t>2021-11-08</a:t>
             </a:fld>
             <a:endParaRPr lang="sv-SE"/>
           </a:p>
@@ -3068,7 +3068,7 @@
         <p:spPr>
           <a:xfrm>
             <a:off x="3059832" y="980728"/>
-            <a:ext cx="2232248" cy="432048"/>
+            <a:ext cx="2232248" cy="504056"/>
           </a:xfrm>
           <a:prstGeom prst="rect">
             <a:avLst/>
@@ -3111,8 +3111,8 @@
         </p:nvSpPr>
         <p:spPr>
           <a:xfrm>
-            <a:off x="3059832" y="1772816"/>
-            <a:ext cx="2232248" cy="432048"/>
+            <a:off x="3059832" y="1844824"/>
+            <a:ext cx="2232248" cy="504056"/>
           </a:xfrm>
           <a:prstGeom prst="rect">
             <a:avLst/>
@@ -3155,8 +3155,8 @@
         </p:nvSpPr>
         <p:spPr>
           <a:xfrm>
-            <a:off x="3059832" y="2564904"/>
-            <a:ext cx="2232248" cy="432048"/>
+            <a:off x="3059832" y="2708920"/>
+            <a:ext cx="2232248" cy="504056"/>
           </a:xfrm>
           <a:prstGeom prst="rect">
             <a:avLst/>
@@ -3207,8 +3207,8 @@
         </p:nvSpPr>
         <p:spPr>
           <a:xfrm>
-            <a:off x="3059832" y="3356992"/>
-            <a:ext cx="2232248" cy="432048"/>
+            <a:off x="3059832" y="3573016"/>
+            <a:ext cx="2232248" cy="504056"/>
           </a:xfrm>
           <a:prstGeom prst="rect">
             <a:avLst/>
@@ -3291,7 +3291,7 @@
         </p:nvSpPr>
         <p:spPr>
           <a:xfrm>
-            <a:off x="4139952" y="1412776"/>
+            <a:off x="4139952" y="1484784"/>
             <a:ext cx="1436740" cy="369332"/>
           </a:xfrm>
           <a:prstGeom prst="rect">
@@ -3325,7 +3325,7 @@
         </p:nvSpPr>
         <p:spPr>
           <a:xfrm>
-            <a:off x="4139952" y="2204864"/>
+            <a:off x="4139952" y="2348880"/>
             <a:ext cx="2045496" cy="369332"/>
           </a:xfrm>
           <a:prstGeom prst="rect">
@@ -3359,7 +3359,7 @@
         </p:nvSpPr>
         <p:spPr>
           <a:xfrm>
-            <a:off x="4139952" y="2996952"/>
+            <a:off x="4139952" y="3212976"/>
             <a:ext cx="2045496" cy="369332"/>
           </a:xfrm>
           <a:prstGeom prst="rect">
@@ -3393,8 +3393,8 @@
         </p:nvSpPr>
         <p:spPr>
           <a:xfrm>
-            <a:off x="3131840" y="4149080"/>
-            <a:ext cx="2045496" cy="369332"/>
+            <a:off x="3203848" y="5301208"/>
+            <a:ext cx="1912768" cy="369332"/>
           </a:xfrm>
           <a:prstGeom prst="rect">
             <a:avLst/>
@@ -3408,12 +3408,16 @@
           <a:lstStyle/>
           <a:p>
             <a:r>
+              <a:rPr lang="sv-SE" dirty="0" err="1" smtClean="0"/>
+              <a:t>Intermediate</a:t>
+            </a:r>
+            <a:r>
               <a:rPr lang="sv-SE" dirty="0" smtClean="0"/>
-              <a:t>Abstract syntax </a:t>
+              <a:t> </a:t>
             </a:r>
             <a:r>
               <a:rPr lang="sv-SE" dirty="0" err="1" smtClean="0"/>
-              <a:t>tree</a:t>
+              <a:t>code</a:t>
             </a:r>
             <a:endParaRPr lang="sv-SE" dirty="0"/>
           </a:p>
@@ -3427,40 +3431,7 @@
         </p:nvCxnSpPr>
         <p:spPr>
           <a:xfrm>
-            <a:off x="4139952" y="620688"/>
-            <a:ext cx="0" cy="360040"/>
-          </a:xfrm>
-          <a:prstGeom prst="straightConnector1">
-            <a:avLst/>
-          </a:prstGeom>
-          <a:ln w="28575">
-            <a:tailEnd type="arrow"/>
-          </a:ln>
-        </p:spPr>
-        <p:style>
-          <a:lnRef idx="1">
-            <a:schemeClr val="accent1"/>
-          </a:lnRef>
-          <a:fillRef idx="0">
-            <a:schemeClr val="accent1"/>
-          </a:fillRef>
-          <a:effectRef idx="0">
-            <a:schemeClr val="accent1"/>
-          </a:effectRef>
-          <a:fontRef idx="minor">
-            <a:schemeClr val="tx1"/>
-          </a:fontRef>
-        </p:style>
-      </p:cxnSp>
-      <p:cxnSp>
-        <p:nvCxnSpPr>
-          <p:cNvPr id="27" name="Rak pil 26"/>
-          <p:cNvCxnSpPr/>
-          <p:nvPr/>
-        </p:nvCxnSpPr>
-        <p:spPr>
-          <a:xfrm>
-            <a:off x="4139952" y="1412776"/>
+            <a:off x="4139952" y="1484784"/>
             <a:ext cx="0" cy="360040"/>
           </a:xfrm>
           <a:prstGeom prst="straightConnector1">
@@ -3493,7 +3464,7 @@
         </p:nvCxnSpPr>
         <p:spPr>
           <a:xfrm>
-            <a:off x="4139952" y="2204864"/>
+            <a:off x="4139952" y="2348880"/>
             <a:ext cx="0" cy="360040"/>
           </a:xfrm>
           <a:prstGeom prst="straightConnector1">
@@ -3526,7 +3497,7 @@
         </p:nvCxnSpPr>
         <p:spPr>
           <a:xfrm>
-            <a:off x="4139952" y="2996952"/>
+            <a:off x="4139952" y="3212976"/>
             <a:ext cx="0" cy="360040"/>
           </a:xfrm>
           <a:prstGeom prst="straightConnector1">
@@ -3559,7 +3530,7 @@
         </p:nvCxnSpPr>
         <p:spPr>
           <a:xfrm>
-            <a:off x="4139952" y="3789040"/>
+            <a:off x="4139952" y="4941168"/>
             <a:ext cx="0" cy="360040"/>
           </a:xfrm>
           <a:prstGeom prst="straightConnector1">
@@ -3592,8 +3563,8 @@
         </p:nvSpPr>
         <p:spPr>
           <a:xfrm>
-            <a:off x="323528" y="2204864"/>
-            <a:ext cx="2232248" cy="432048"/>
+            <a:off x="107504" y="2708920"/>
+            <a:ext cx="2232248" cy="504056"/>
           </a:xfrm>
           <a:prstGeom prst="rect">
             <a:avLst/>
@@ -3636,8 +3607,8 @@
         </p:nvSpPr>
         <p:spPr>
           <a:xfrm>
-            <a:off x="6660232" y="2204864"/>
-            <a:ext cx="2232248" cy="432048"/>
+            <a:off x="6300192" y="2708920"/>
+            <a:ext cx="2232248" cy="504056"/>
           </a:xfrm>
           <a:prstGeom prst="rect">
             <a:avLst/>
@@ -3691,8 +3662,8 @@
         </p:nvCxnSpPr>
         <p:spPr>
           <a:xfrm flipH="1">
-            <a:off x="1439652" y="1196752"/>
-            <a:ext cx="1620180" cy="1008112"/>
+            <a:off x="1223628" y="1232756"/>
+            <a:ext cx="1836204" cy="1476164"/>
           </a:xfrm>
           <a:prstGeom prst="line">
             <a:avLst/>
@@ -3727,8 +3698,8 @@
         </p:nvCxnSpPr>
         <p:spPr>
           <a:xfrm flipH="1">
-            <a:off x="1439652" y="1988840"/>
-            <a:ext cx="1620180" cy="216024"/>
+            <a:off x="1223628" y="2096852"/>
+            <a:ext cx="1836204" cy="612068"/>
           </a:xfrm>
           <a:prstGeom prst="line">
             <a:avLst/>
@@ -3757,14 +3728,14 @@
           <p:cNvPr id="38" name="Rak 37"/>
           <p:cNvCxnSpPr>
             <a:stCxn id="6" idx="1"/>
-            <a:endCxn id="31" idx="2"/>
+            <a:endCxn id="31" idx="3"/>
           </p:cNvCxnSpPr>
           <p:nvPr/>
         </p:nvCxnSpPr>
         <p:spPr>
-          <a:xfrm flipH="1" flipV="1">
-            <a:off x="1439652" y="2636912"/>
-            <a:ext cx="1620180" cy="144016"/>
+          <a:xfrm flipH="1">
+            <a:off x="2339752" y="2960948"/>
+            <a:ext cx="720080" cy="0"/>
           </a:xfrm>
           <a:prstGeom prst="line">
             <a:avLst/>
@@ -3792,14 +3763,15 @@
         <p:nvCxnSpPr>
           <p:cNvPr id="41" name="Rak 40"/>
           <p:cNvCxnSpPr>
+            <a:stCxn id="7" idx="1"/>
             <a:endCxn id="31" idx="2"/>
           </p:cNvCxnSpPr>
           <p:nvPr/>
         </p:nvCxnSpPr>
         <p:spPr>
           <a:xfrm flipH="1" flipV="1">
-            <a:off x="1439652" y="2636912"/>
-            <a:ext cx="1584176" cy="936104"/>
+            <a:off x="1223628" y="3212976"/>
+            <a:ext cx="1836204" cy="612068"/>
           </a:xfrm>
           <a:prstGeom prst="line">
             <a:avLst/>
@@ -3834,8 +3806,8 @@
         </p:nvCxnSpPr>
         <p:spPr>
           <a:xfrm flipH="1" flipV="1">
-            <a:off x="5292080" y="1196752"/>
-            <a:ext cx="2484276" cy="1008112"/>
+            <a:off x="5292080" y="1232756"/>
+            <a:ext cx="2124236" cy="1476164"/>
           </a:xfrm>
           <a:prstGeom prst="line">
             <a:avLst/>
@@ -3870,8 +3842,8 @@
         </p:nvCxnSpPr>
         <p:spPr>
           <a:xfrm flipH="1" flipV="1">
-            <a:off x="5292080" y="1988840"/>
-            <a:ext cx="2484276" cy="216024"/>
+            <a:off x="5292080" y="2096852"/>
+            <a:ext cx="2124236" cy="612068"/>
           </a:xfrm>
           <a:prstGeom prst="line">
             <a:avLst/>
@@ -3899,15 +3871,15 @@
         <p:nvCxnSpPr>
           <p:cNvPr id="50" name="Rak 49"/>
           <p:cNvCxnSpPr>
-            <a:stCxn id="32" idx="2"/>
+            <a:stCxn id="32" idx="1"/>
             <a:endCxn id="6" idx="3"/>
           </p:cNvCxnSpPr>
           <p:nvPr/>
         </p:nvCxnSpPr>
         <p:spPr>
           <a:xfrm flipH="1">
-            <a:off x="5292080" y="2636912"/>
-            <a:ext cx="2484276" cy="144016"/>
+            <a:off x="5292080" y="2960948"/>
+            <a:ext cx="1008112" cy="0"/>
           </a:xfrm>
           <a:prstGeom prst="line">
             <a:avLst/>
@@ -3942,8 +3914,8 @@
         </p:nvCxnSpPr>
         <p:spPr>
           <a:xfrm flipH="1">
-            <a:off x="5292080" y="2636912"/>
-            <a:ext cx="2484276" cy="936104"/>
+            <a:off x="5292080" y="3212976"/>
+            <a:ext cx="2124236" cy="612068"/>
           </a:xfrm>
           <a:prstGeom prst="line">
             <a:avLst/>
@@ -3961,6 +3933,234 @@
           </a:fillRef>
           <a:effectRef idx="0">
             <a:schemeClr val="dk1"/>
+          </a:effectRef>
+          <a:fontRef idx="minor">
+            <a:schemeClr val="tx1"/>
+          </a:fontRef>
+        </p:style>
+      </p:cxnSp>
+      <p:sp>
+        <p:nvSpPr>
+          <p:cNvPr id="26" name="Rektangel 25"/>
+          <p:cNvSpPr/>
+          <p:nvPr/>
+        </p:nvSpPr>
+        <p:spPr>
+          <a:xfrm>
+            <a:off x="3059832" y="4437112"/>
+            <a:ext cx="2232248" cy="504056"/>
+          </a:xfrm>
+          <a:prstGeom prst="rect">
+            <a:avLst/>
+          </a:prstGeom>
+        </p:spPr>
+        <p:style>
+          <a:lnRef idx="2">
+            <a:schemeClr val="accent1">
+              <a:shade val="50000"/>
+            </a:schemeClr>
+          </a:lnRef>
+          <a:fillRef idx="1">
+            <a:schemeClr val="accent1"/>
+          </a:fillRef>
+          <a:effectRef idx="0">
+            <a:schemeClr val="accent1"/>
+          </a:effectRef>
+          <a:fontRef idx="minor">
+            <a:schemeClr val="lt1"/>
+          </a:fontRef>
+        </p:style>
+        <p:txBody>
+          <a:bodyPr rtlCol="0" anchor="ctr"/>
+          <a:lstStyle/>
+          <a:p>
+            <a:pPr algn="ctr"/>
+            <a:r>
+              <a:rPr lang="sv-SE" dirty="0" err="1" smtClean="0"/>
+              <a:t>Intermediate</a:t>
+            </a:r>
+            <a:r>
+              <a:rPr lang="sv-SE" dirty="0" smtClean="0"/>
+              <a:t> </a:t>
+            </a:r>
+            <a:r>
+              <a:rPr lang="sv-SE" dirty="0" err="1" smtClean="0"/>
+              <a:t>Code</a:t>
+            </a:r>
+            <a:r>
+              <a:rPr lang="sv-SE" dirty="0" smtClean="0"/>
+              <a:t> Generator</a:t>
+            </a:r>
+            <a:endParaRPr lang="sv-SE" dirty="0"/>
+          </a:p>
+        </p:txBody>
+      </p:sp>
+      <p:sp>
+        <p:nvSpPr>
+          <p:cNvPr id="64" name="textruta 63"/>
+          <p:cNvSpPr txBox="1"/>
+          <p:nvPr/>
+        </p:nvSpPr>
+        <p:spPr>
+          <a:xfrm>
+            <a:off x="4139952" y="4077072"/>
+            <a:ext cx="2045496" cy="369332"/>
+          </a:xfrm>
+          <a:prstGeom prst="rect">
+            <a:avLst/>
+          </a:prstGeom>
+          <a:noFill/>
+        </p:spPr>
+        <p:txBody>
+          <a:bodyPr wrap="none" rtlCol="0">
+            <a:spAutoFit/>
+          </a:bodyPr>
+          <a:lstStyle/>
+          <a:p>
+            <a:r>
+              <a:rPr lang="sv-SE" dirty="0" smtClean="0"/>
+              <a:t>Abstract syntax </a:t>
+            </a:r>
+            <a:r>
+              <a:rPr lang="sv-SE" dirty="0" err="1" smtClean="0"/>
+              <a:t>tree</a:t>
+            </a:r>
+            <a:endParaRPr lang="sv-SE" dirty="0"/>
+          </a:p>
+        </p:txBody>
+      </p:sp>
+      <p:cxnSp>
+        <p:nvCxnSpPr>
+          <p:cNvPr id="65" name="Rak pil 64"/>
+          <p:cNvCxnSpPr/>
+          <p:nvPr/>
+        </p:nvCxnSpPr>
+        <p:spPr>
+          <a:xfrm>
+            <a:off x="4139952" y="4077072"/>
+            <a:ext cx="0" cy="360040"/>
+          </a:xfrm>
+          <a:prstGeom prst="straightConnector1">
+            <a:avLst/>
+          </a:prstGeom>
+          <a:ln w="28575">
+            <a:tailEnd type="arrow"/>
+          </a:ln>
+        </p:spPr>
+        <p:style>
+          <a:lnRef idx="1">
+            <a:schemeClr val="accent1"/>
+          </a:lnRef>
+          <a:fillRef idx="0">
+            <a:schemeClr val="accent1"/>
+          </a:fillRef>
+          <a:effectRef idx="0">
+            <a:schemeClr val="accent1"/>
+          </a:effectRef>
+          <a:fontRef idx="minor">
+            <a:schemeClr val="tx1"/>
+          </a:fontRef>
+        </p:style>
+      </p:cxnSp>
+      <p:cxnSp>
+        <p:nvCxnSpPr>
+          <p:cNvPr id="108" name="Rak 107"/>
+          <p:cNvCxnSpPr>
+            <a:stCxn id="26" idx="1"/>
+            <a:endCxn id="31" idx="2"/>
+          </p:cNvCxnSpPr>
+          <p:nvPr/>
+        </p:nvCxnSpPr>
+        <p:spPr>
+          <a:xfrm flipH="1" flipV="1">
+            <a:off x="1223628" y="3212976"/>
+            <a:ext cx="1836204" cy="1476164"/>
+          </a:xfrm>
+          <a:prstGeom prst="line">
+            <a:avLst/>
+          </a:prstGeom>
+          <a:ln>
+            <a:prstDash val="lgDash"/>
+          </a:ln>
+        </p:spPr>
+        <p:style>
+          <a:lnRef idx="1">
+            <a:schemeClr val="dk1"/>
+          </a:lnRef>
+          <a:fillRef idx="0">
+            <a:schemeClr val="dk1"/>
+          </a:fillRef>
+          <a:effectRef idx="0">
+            <a:schemeClr val="dk1"/>
+          </a:effectRef>
+          <a:fontRef idx="minor">
+            <a:schemeClr val="tx1"/>
+          </a:fontRef>
+        </p:style>
+      </p:cxnSp>
+      <p:cxnSp>
+        <p:nvCxnSpPr>
+          <p:cNvPr id="111" name="Rak 110"/>
+          <p:cNvCxnSpPr>
+            <a:stCxn id="32" idx="2"/>
+            <a:endCxn id="26" idx="3"/>
+          </p:cNvCxnSpPr>
+          <p:nvPr/>
+        </p:nvCxnSpPr>
+        <p:spPr>
+          <a:xfrm flipH="1">
+            <a:off x="5292080" y="3212976"/>
+            <a:ext cx="2124236" cy="1476164"/>
+          </a:xfrm>
+          <a:prstGeom prst="line">
+            <a:avLst/>
+          </a:prstGeom>
+          <a:ln>
+            <a:prstDash val="lgDash"/>
+          </a:ln>
+        </p:spPr>
+        <p:style>
+          <a:lnRef idx="1">
+            <a:schemeClr val="dk1"/>
+          </a:lnRef>
+          <a:fillRef idx="0">
+            <a:schemeClr val="dk1"/>
+          </a:fillRef>
+          <a:effectRef idx="0">
+            <a:schemeClr val="dk1"/>
+          </a:effectRef>
+          <a:fontRef idx="minor">
+            <a:schemeClr val="tx1"/>
+          </a:fontRef>
+        </p:style>
+      </p:cxnSp>
+      <p:cxnSp>
+        <p:nvCxnSpPr>
+          <p:cNvPr id="124" name="Rak pil 123"/>
+          <p:cNvCxnSpPr/>
+          <p:nvPr/>
+        </p:nvCxnSpPr>
+        <p:spPr>
+          <a:xfrm>
+            <a:off x="4139952" y="620688"/>
+            <a:ext cx="0" cy="360040"/>
+          </a:xfrm>
+          <a:prstGeom prst="straightConnector1">
+            <a:avLst/>
+          </a:prstGeom>
+          <a:ln w="28575">
+            <a:tailEnd type="arrow"/>
+          </a:ln>
+        </p:spPr>
+        <p:style>
+          <a:lnRef idx="1">
+            <a:schemeClr val="accent1"/>
+          </a:lnRef>
+          <a:fillRef idx="0">
+            <a:schemeClr val="accent1"/>
+          </a:fillRef>
+          <a:effectRef idx="0">
+            <a:schemeClr val="accent1"/>
           </a:effectRef>
           <a:fontRef idx="minor">
             <a:schemeClr val="tx1"/>

</xml_diff>

<commit_message>
Add target code generator to the sea sub compiler
Compiles intermediate code to x86-64 assembler.
</commit_message>
<xml_diff>
--- a/img/Architecture.pptx
+++ b/img/Architecture.pptx
@@ -3393,8 +3393,8 @@
         </p:nvSpPr>
         <p:spPr>
           <a:xfrm>
-            <a:off x="3203848" y="5301208"/>
-            <a:ext cx="1912768" cy="369332"/>
+            <a:off x="3059832" y="6165304"/>
+            <a:ext cx="2247154" cy="369332"/>
           </a:xfrm>
           <a:prstGeom prst="rect">
             <a:avLst/>
@@ -3408,8 +3408,12 @@
           <a:lstStyle/>
           <a:p>
             <a:r>
+              <a:rPr lang="sv-SE" dirty="0" smtClean="0"/>
+              <a:t>Target </a:t>
+            </a:r>
+            <a:r>
               <a:rPr lang="sv-SE" dirty="0" err="1" smtClean="0"/>
-              <a:t>Intermediate</a:t>
+              <a:t>assembly</a:t>
             </a:r>
             <a:r>
               <a:rPr lang="sv-SE" dirty="0" smtClean="0"/>
@@ -3563,7 +3567,7 @@
         </p:nvSpPr>
         <p:spPr>
           <a:xfrm>
-            <a:off x="107504" y="2708920"/>
+            <a:off x="251520" y="3140968"/>
             <a:ext cx="2232248" cy="504056"/>
           </a:xfrm>
           <a:prstGeom prst="rect">
@@ -3607,7 +3611,7 @@
         </p:nvSpPr>
         <p:spPr>
           <a:xfrm>
-            <a:off x="6300192" y="2708920"/>
+            <a:off x="6588224" y="3140968"/>
             <a:ext cx="2232248" cy="504056"/>
           </a:xfrm>
           <a:prstGeom prst="rect">
@@ -3662,8 +3666,8 @@
         </p:nvCxnSpPr>
         <p:spPr>
           <a:xfrm flipH="1">
-            <a:off x="1223628" y="1232756"/>
-            <a:ext cx="1836204" cy="1476164"/>
+            <a:off x="1367644" y="1232756"/>
+            <a:ext cx="1692188" cy="1908212"/>
           </a:xfrm>
           <a:prstGeom prst="line">
             <a:avLst/>
@@ -3698,8 +3702,8 @@
         </p:nvCxnSpPr>
         <p:spPr>
           <a:xfrm flipH="1">
-            <a:off x="1223628" y="2096852"/>
-            <a:ext cx="1836204" cy="612068"/>
+            <a:off x="1367644" y="2096852"/>
+            <a:ext cx="1692188" cy="1044116"/>
           </a:xfrm>
           <a:prstGeom prst="line">
             <a:avLst/>
@@ -3728,14 +3732,14 @@
           <p:cNvPr id="38" name="Rak 37"/>
           <p:cNvCxnSpPr>
             <a:stCxn id="6" idx="1"/>
-            <a:endCxn id="31" idx="3"/>
+            <a:endCxn id="31" idx="0"/>
           </p:cNvCxnSpPr>
           <p:nvPr/>
         </p:nvCxnSpPr>
         <p:spPr>
           <a:xfrm flipH="1">
-            <a:off x="2339752" y="2960948"/>
-            <a:ext cx="720080" cy="0"/>
+            <a:off x="1367644" y="2960948"/>
+            <a:ext cx="1692188" cy="180020"/>
           </a:xfrm>
           <a:prstGeom prst="line">
             <a:avLst/>
@@ -3770,8 +3774,8 @@
         </p:nvCxnSpPr>
         <p:spPr>
           <a:xfrm flipH="1" flipV="1">
-            <a:off x="1223628" y="3212976"/>
-            <a:ext cx="1836204" cy="612068"/>
+            <a:off x="1367644" y="3645024"/>
+            <a:ext cx="1692188" cy="180020"/>
           </a:xfrm>
           <a:prstGeom prst="line">
             <a:avLst/>
@@ -3807,7 +3811,7 @@
         <p:spPr>
           <a:xfrm flipH="1" flipV="1">
             <a:off x="5292080" y="1232756"/>
-            <a:ext cx="2124236" cy="1476164"/>
+            <a:ext cx="2412268" cy="1908212"/>
           </a:xfrm>
           <a:prstGeom prst="line">
             <a:avLst/>
@@ -3843,7 +3847,7 @@
         <p:spPr>
           <a:xfrm flipH="1" flipV="1">
             <a:off x="5292080" y="2096852"/>
-            <a:ext cx="2124236" cy="612068"/>
+            <a:ext cx="2412268" cy="1044116"/>
           </a:xfrm>
           <a:prstGeom prst="line">
             <a:avLst/>
@@ -3871,15 +3875,15 @@
         <p:nvCxnSpPr>
           <p:cNvPr id="50" name="Rak 49"/>
           <p:cNvCxnSpPr>
-            <a:stCxn id="32" idx="1"/>
+            <a:stCxn id="32" idx="0"/>
             <a:endCxn id="6" idx="3"/>
           </p:cNvCxnSpPr>
           <p:nvPr/>
         </p:nvCxnSpPr>
         <p:spPr>
-          <a:xfrm flipH="1">
+          <a:xfrm flipH="1" flipV="1">
             <a:off x="5292080" y="2960948"/>
-            <a:ext cx="1008112" cy="0"/>
+            <a:ext cx="2412268" cy="180020"/>
           </a:xfrm>
           <a:prstGeom prst="line">
             <a:avLst/>
@@ -3914,8 +3918,8 @@
         </p:nvCxnSpPr>
         <p:spPr>
           <a:xfrm flipH="1">
-            <a:off x="5292080" y="3212976"/>
-            <a:ext cx="2124236" cy="612068"/>
+            <a:off x="5292080" y="3645024"/>
+            <a:ext cx="2412268" cy="180020"/>
           </a:xfrm>
           <a:prstGeom prst="line">
             <a:avLst/>
@@ -4073,8 +4077,8 @@
         </p:nvCxnSpPr>
         <p:spPr>
           <a:xfrm flipH="1" flipV="1">
-            <a:off x="1223628" y="3212976"/>
-            <a:ext cx="1836204" cy="1476164"/>
+            <a:off x="1367644" y="3645024"/>
+            <a:ext cx="1692188" cy="1044116"/>
           </a:xfrm>
           <a:prstGeom prst="line">
             <a:avLst/>
@@ -4109,8 +4113,8 @@
         </p:nvCxnSpPr>
         <p:spPr>
           <a:xfrm flipH="1">
-            <a:off x="5292080" y="3212976"/>
-            <a:ext cx="2124236" cy="1476164"/>
+            <a:off x="5292080" y="3645024"/>
+            <a:ext cx="2412268" cy="1044116"/>
           </a:xfrm>
           <a:prstGeom prst="line">
             <a:avLst/>
@@ -4167,6 +4171,201 @@
           </a:fontRef>
         </p:style>
       </p:cxnSp>
+      <p:sp>
+        <p:nvSpPr>
+          <p:cNvPr id="33" name="Rektangel 32"/>
+          <p:cNvSpPr/>
+          <p:nvPr/>
+        </p:nvSpPr>
+        <p:spPr>
+          <a:xfrm>
+            <a:off x="3059832" y="5301208"/>
+            <a:ext cx="2232248" cy="504056"/>
+          </a:xfrm>
+          <a:prstGeom prst="rect">
+            <a:avLst/>
+          </a:prstGeom>
+        </p:spPr>
+        <p:style>
+          <a:lnRef idx="2">
+            <a:schemeClr val="accent1">
+              <a:shade val="50000"/>
+            </a:schemeClr>
+          </a:lnRef>
+          <a:fillRef idx="1">
+            <a:schemeClr val="accent1"/>
+          </a:fillRef>
+          <a:effectRef idx="0">
+            <a:schemeClr val="accent1"/>
+          </a:effectRef>
+          <a:fontRef idx="minor">
+            <a:schemeClr val="lt1"/>
+          </a:fontRef>
+        </p:style>
+        <p:txBody>
+          <a:bodyPr rtlCol="0" anchor="ctr"/>
+          <a:lstStyle/>
+          <a:p>
+            <a:pPr algn="ctr"/>
+            <a:r>
+              <a:rPr lang="sv-SE" dirty="0" smtClean="0"/>
+              <a:t>Target </a:t>
+            </a:r>
+            <a:r>
+              <a:rPr lang="sv-SE" dirty="0" err="1" smtClean="0"/>
+              <a:t>Code</a:t>
+            </a:r>
+            <a:r>
+              <a:rPr lang="sv-SE" dirty="0" smtClean="0"/>
+              <a:t> Generator</a:t>
+            </a:r>
+            <a:endParaRPr lang="sv-SE" dirty="0"/>
+          </a:p>
+        </p:txBody>
+      </p:sp>
+      <p:cxnSp>
+        <p:nvCxnSpPr>
+          <p:cNvPr id="36" name="Rak pil 35"/>
+          <p:cNvCxnSpPr/>
+          <p:nvPr/>
+        </p:nvCxnSpPr>
+        <p:spPr>
+          <a:xfrm>
+            <a:off x="4139952" y="5805264"/>
+            <a:ext cx="0" cy="360040"/>
+          </a:xfrm>
+          <a:prstGeom prst="straightConnector1">
+            <a:avLst/>
+          </a:prstGeom>
+          <a:ln w="28575">
+            <a:tailEnd type="arrow"/>
+          </a:ln>
+        </p:spPr>
+        <p:style>
+          <a:lnRef idx="1">
+            <a:schemeClr val="accent1"/>
+          </a:lnRef>
+          <a:fillRef idx="0">
+            <a:schemeClr val="accent1"/>
+          </a:fillRef>
+          <a:effectRef idx="0">
+            <a:schemeClr val="accent1"/>
+          </a:effectRef>
+          <a:fontRef idx="minor">
+            <a:schemeClr val="tx1"/>
+          </a:fontRef>
+        </p:style>
+      </p:cxnSp>
+      <p:cxnSp>
+        <p:nvCxnSpPr>
+          <p:cNvPr id="47" name="Rak 46"/>
+          <p:cNvCxnSpPr>
+            <a:stCxn id="33" idx="1"/>
+            <a:endCxn id="31" idx="2"/>
+          </p:cNvCxnSpPr>
+          <p:nvPr/>
+        </p:nvCxnSpPr>
+        <p:spPr>
+          <a:xfrm flipH="1" flipV="1">
+            <a:off x="1367644" y="3645024"/>
+            <a:ext cx="1692188" cy="1908212"/>
+          </a:xfrm>
+          <a:prstGeom prst="line">
+            <a:avLst/>
+          </a:prstGeom>
+          <a:ln>
+            <a:prstDash val="lgDash"/>
+          </a:ln>
+        </p:spPr>
+        <p:style>
+          <a:lnRef idx="1">
+            <a:schemeClr val="dk1"/>
+          </a:lnRef>
+          <a:fillRef idx="0">
+            <a:schemeClr val="dk1"/>
+          </a:fillRef>
+          <a:effectRef idx="0">
+            <a:schemeClr val="dk1"/>
+          </a:effectRef>
+          <a:fontRef idx="minor">
+            <a:schemeClr val="tx1"/>
+          </a:fontRef>
+        </p:style>
+      </p:cxnSp>
+      <p:cxnSp>
+        <p:nvCxnSpPr>
+          <p:cNvPr id="59" name="Rak 58"/>
+          <p:cNvCxnSpPr>
+            <a:stCxn id="32" idx="2"/>
+            <a:endCxn id="33" idx="3"/>
+          </p:cNvCxnSpPr>
+          <p:nvPr/>
+        </p:nvCxnSpPr>
+        <p:spPr>
+          <a:xfrm flipH="1">
+            <a:off x="5292080" y="3645024"/>
+            <a:ext cx="2412268" cy="1908212"/>
+          </a:xfrm>
+          <a:prstGeom prst="line">
+            <a:avLst/>
+          </a:prstGeom>
+          <a:ln>
+            <a:prstDash val="lgDash"/>
+          </a:ln>
+        </p:spPr>
+        <p:style>
+          <a:lnRef idx="1">
+            <a:schemeClr val="dk1"/>
+          </a:lnRef>
+          <a:fillRef idx="0">
+            <a:schemeClr val="dk1"/>
+          </a:fillRef>
+          <a:effectRef idx="0">
+            <a:schemeClr val="dk1"/>
+          </a:effectRef>
+          <a:fontRef idx="minor">
+            <a:schemeClr val="tx1"/>
+          </a:fontRef>
+        </p:style>
+      </p:cxnSp>
+      <p:sp>
+        <p:nvSpPr>
+          <p:cNvPr id="37" name="textruta 36"/>
+          <p:cNvSpPr txBox="1"/>
+          <p:nvPr/>
+        </p:nvSpPr>
+        <p:spPr>
+          <a:xfrm>
+            <a:off x="4139952" y="4941168"/>
+            <a:ext cx="1912768" cy="369332"/>
+          </a:xfrm>
+          <a:prstGeom prst="rect">
+            <a:avLst/>
+          </a:prstGeom>
+          <a:noFill/>
+        </p:spPr>
+        <p:txBody>
+          <a:bodyPr wrap="none" rtlCol="0">
+            <a:spAutoFit/>
+          </a:bodyPr>
+          <a:lstStyle/>
+          <a:p>
+            <a:r>
+              <a:rPr lang="sv-SE" dirty="0" err="1" smtClean="0"/>
+              <a:t>Intermediate</a:t>
+            </a:r>
+            <a:r>
+              <a:rPr lang="sv-SE" dirty="0" smtClean="0"/>
+              <a:t> </a:t>
+            </a:r>
+            <a:r>
+              <a:rPr lang="sv-SE" dirty="0" err="1" smtClean="0"/>
+              <a:t>code</a:t>
+            </a:r>
+            <a:endParaRPr lang="sv-SE" dirty="0"/>
+          </a:p>
+        </p:txBody>
+      </p:sp>
     </p:spTree>
   </p:cSld>
   <p:clrMapOvr>

</xml_diff>